<commit_message>
Première version du cours SSH
</commit_message>
<xml_diff>
--- a/Module04_AdminSysLinux/Cours99Logs.pptx
+++ b/Module04_AdminSysLinux/Cours99Logs.pptx
@@ -1156,6 +1156,53 @@
     </pc:docChg>
   </pc:docChgLst>
   <pc:docChgLst>
+    <pc:chgData name="Jean-Pierre Duchesneau" userId="a41dad7d-4331-478d-884a-a37b1c6c6add" providerId="ADAL" clId="{A9C8DAB9-0952-46FA-A721-61B8D3A3BF05}"/>
+    <pc:docChg chg="modSld">
+      <pc:chgData name="Jean-Pierre Duchesneau" userId="a41dad7d-4331-478d-884a-a37b1c6c6add" providerId="ADAL" clId="{A9C8DAB9-0952-46FA-A721-61B8D3A3BF05}" dt="2021-05-26T19:21:12.959" v="3" actId="20577"/>
+      <pc:docMkLst>
+        <pc:docMk/>
+      </pc:docMkLst>
+      <pc:sldChg chg="modSp mod">
+        <pc:chgData name="Jean-Pierre Duchesneau" userId="a41dad7d-4331-478d-884a-a37b1c6c6add" providerId="ADAL" clId="{A9C8DAB9-0952-46FA-A721-61B8D3A3BF05}" dt="2021-05-26T19:21:12.959" v="3" actId="20577"/>
+        <pc:sldMkLst>
+          <pc:docMk/>
+          <pc:sldMk cId="2471807738" sldId="256"/>
+        </pc:sldMkLst>
+        <pc:spChg chg="mod">
+          <ac:chgData name="Jean-Pierre Duchesneau" userId="a41dad7d-4331-478d-884a-a37b1c6c6add" providerId="ADAL" clId="{A9C8DAB9-0952-46FA-A721-61B8D3A3BF05}" dt="2021-05-26T19:21:12.959" v="3" actId="20577"/>
+          <ac:spMkLst>
+            <pc:docMk/>
+            <pc:sldMk cId="2471807738" sldId="256"/>
+            <ac:spMk id="5" creationId="{B7CC0014-23B9-4349-AECA-C074DE98FC32}"/>
+          </ac:spMkLst>
+        </pc:spChg>
+      </pc:sldChg>
+      <pc:sldChg chg="modSp mod">
+        <pc:chgData name="Jean-Pierre Duchesneau" userId="a41dad7d-4331-478d-884a-a37b1c6c6add" providerId="ADAL" clId="{A9C8DAB9-0952-46FA-A721-61B8D3A3BF05}" dt="2021-05-26T19:20:48.716" v="1" actId="14100"/>
+        <pc:sldMkLst>
+          <pc:docMk/>
+          <pc:sldMk cId="4258044425" sldId="276"/>
+        </pc:sldMkLst>
+        <pc:picChg chg="mod">
+          <ac:chgData name="Jean-Pierre Duchesneau" userId="a41dad7d-4331-478d-884a-a37b1c6c6add" providerId="ADAL" clId="{A9C8DAB9-0952-46FA-A721-61B8D3A3BF05}" dt="2021-05-26T19:20:48.716" v="1" actId="14100"/>
+          <ac:picMkLst>
+            <pc:docMk/>
+            <pc:sldMk cId="4258044425" sldId="276"/>
+            <ac:picMk id="5" creationId="{A35475B2-8459-43BD-B0C5-A8A3775FE6B4}"/>
+          </ac:picMkLst>
+        </pc:picChg>
+        <pc:picChg chg="mod">
+          <ac:chgData name="Jean-Pierre Duchesneau" userId="a41dad7d-4331-478d-884a-a37b1c6c6add" providerId="ADAL" clId="{A9C8DAB9-0952-46FA-A721-61B8D3A3BF05}" dt="2021-05-26T19:20:40.873" v="0" actId="1076"/>
+          <ac:picMkLst>
+            <pc:docMk/>
+            <pc:sldMk cId="4258044425" sldId="276"/>
+            <ac:picMk id="6" creationId="{1F3B8B55-7D26-4030-BE90-B7D45BCC9921}"/>
+          </ac:picMkLst>
+        </pc:picChg>
+      </pc:sldChg>
+    </pc:docChg>
+  </pc:docChgLst>
+  <pc:docChgLst>
     <pc:chgData name="Jean-Pierre Duchesneau" userId="a41dad7d-4331-478d-884a-a37b1c6c6add" providerId="ADAL" clId="{CE5A85C5-5A91-42F3-B57C-76074ED66CA6}"/>
     <pc:docChg chg="delSld delSection modSection">
       <pc:chgData name="Jean-Pierre Duchesneau" userId="a41dad7d-4331-478d-884a-a37b1c6c6add" providerId="ADAL" clId="{CE5A85C5-5A91-42F3-B57C-76074ED66CA6}" dt="2021-05-24T16:56:49.314" v="2" actId="17851"/>
@@ -1265,7 +1312,7 @@
             <a:pPr rtl="0"/>
             <a:fld id="{153B9F70-C9FE-45FE-8BA2-11B9BDB0807C}" type="datetime1">
               <a:rPr lang="fr-FR" smtClean="0"/>
-              <a:t>24/05/2021</a:t>
+              <a:t>26/05/2021</a:t>
             </a:fld>
             <a:endParaRPr lang="fr-FR" dirty="0"/>
           </a:p>
@@ -1435,7 +1482,7 @@
             <a:pPr rtl="0"/>
             <a:fld id="{722DDE82-2D54-4AB2-8114-EB06BAB63866}" type="datetime1">
               <a:rPr lang="fr-FR" noProof="0" smtClean="0"/>
-              <a:t>24/05/2021</a:t>
+              <a:t>26/05/2021</a:t>
             </a:fld>
             <a:endParaRPr lang="fr-FR" noProof="0" dirty="0"/>
           </a:p>
@@ -2327,7 +2374,7 @@
             <a:pPr rtl="0"/>
             <a:fld id="{4F100C82-D502-454B-9D54-D5DEB14EB94C}" type="datetime1">
               <a:rPr lang="fr-FR" noProof="0" smtClean="0"/>
-              <a:t>24/05/2021</a:t>
+              <a:t>26/05/2021</a:t>
             </a:fld>
             <a:endParaRPr lang="fr-FR" noProof="0" dirty="0"/>
           </a:p>
@@ -2991,7 +3038,7 @@
             <a:pPr rtl="0"/>
             <a:fld id="{2E4A3FCC-7018-480A-9973-FBF3BF4CEEDD}" type="datetime1">
               <a:rPr lang="fr-FR" noProof="0" smtClean="0"/>
-              <a:t>24/05/2021</a:t>
+              <a:t>26/05/2021</a:t>
             </a:fld>
             <a:endParaRPr lang="fr-FR" noProof="0" dirty="0"/>
           </a:p>
@@ -3615,7 +3662,7 @@
           <a:p>
             <a:r>
               <a:rPr lang="fr-CA" dirty="0"/>
-              <a:t>Jean-Pierre Duchesneau, Été 2020</a:t>
+              <a:t>Jean-Pierre Duchesneau, Été 2021</a:t>
             </a:r>
           </a:p>
         </p:txBody>
@@ -4539,8 +4586,8 @@
         </p:blipFill>
         <p:spPr>
           <a:xfrm>
-            <a:off x="312905" y="2552700"/>
-            <a:ext cx="7376199" cy="4368251"/>
+            <a:off x="312905" y="2800350"/>
+            <a:ext cx="6958019" cy="4120601"/>
           </a:xfrm>
           <a:prstGeom prst="rect">
             <a:avLst/>
@@ -4569,7 +4616,7 @@
         </p:blipFill>
         <p:spPr>
           <a:xfrm>
-            <a:off x="6575042" y="338137"/>
+            <a:off x="6575042" y="1185862"/>
             <a:ext cx="5304053" cy="3300413"/>
           </a:xfrm>
           <a:prstGeom prst="rect">
@@ -7848,12 +7895,9 @@
 </file>
 
 <file path=customXml/item1.xml><?xml version="1.0" encoding="utf-8"?>
-<?mso-contentType ?>
-<FormTemplates xmlns="http://schemas.microsoft.com/sharepoint/v3/contenttype/forms">
-  <Display>DocumentLibraryForm</Display>
-  <Edit>DocumentLibraryForm</Edit>
-  <New>DocumentLibraryForm</New>
-</FormTemplates>
+<p:properties xmlns:p="http://schemas.microsoft.com/office/2006/metadata/properties" xmlns:xsi="http://www.w3.org/2001/XMLSchema-instance" xmlns:pc="http://schemas.microsoft.com/office/infopath/2007/PartnerControls">
+  <documentManagement/>
+</p:properties>
 </file>
 
 <file path=customXml/item2.xml><?xml version="1.0" encoding="utf-8"?>
@@ -8066,15 +8110,27 @@
 </file>
 
 <file path=customXml/item3.xml><?xml version="1.0" encoding="utf-8"?>
-<p:properties xmlns:p="http://schemas.microsoft.com/office/2006/metadata/properties" xmlns:xsi="http://www.w3.org/2001/XMLSchema-instance" xmlns:pc="http://schemas.microsoft.com/office/infopath/2007/PartnerControls">
-  <documentManagement/>
-</p:properties>
+<?mso-contentType ?>
+<FormTemplates xmlns="http://schemas.microsoft.com/sharepoint/v3/contenttype/forms">
+  <Display>DocumentLibraryForm</Display>
+  <Edit>DocumentLibraryForm</Edit>
+  <New>DocumentLibraryForm</New>
+</FormTemplates>
 </file>
 
 <file path=customXml/itemProps1.xml><?xml version="1.0" encoding="utf-8"?>
-<ds:datastoreItem xmlns:ds="http://schemas.openxmlformats.org/officeDocument/2006/customXml" ds:itemID="{30F2025D-B737-41D8-9334-EE8F2C238280}">
+<ds:datastoreItem xmlns:ds="http://schemas.openxmlformats.org/officeDocument/2006/customXml" ds:itemID="{9B780DE2-F02B-441B-A6E9-690F74AB081C}">
   <ds:schemaRefs>
-    <ds:schemaRef ds:uri="http://schemas.microsoft.com/sharepoint/v3/contenttype/forms"/>
+    <ds:schemaRef ds:uri="http://schemas.microsoft.com/office/2006/documentManagement/types"/>
+    <ds:schemaRef ds:uri="634a623b-b5c2-41f0-818c-5d787e90d776"/>
+    <ds:schemaRef ds:uri="http://www.w3.org/XML/1998/namespace"/>
+    <ds:schemaRef ds:uri="http://schemas.openxmlformats.org/package/2006/metadata/core-properties"/>
+    <ds:schemaRef ds:uri="http://schemas.microsoft.com/office/2006/metadata/properties"/>
+    <ds:schemaRef ds:uri="http://purl.org/dc/elements/1.1/"/>
+    <ds:schemaRef ds:uri="http://purl.org/dc/dcmitype/"/>
+    <ds:schemaRef ds:uri="http://schemas.microsoft.com/office/infopath/2007/PartnerControls"/>
+    <ds:schemaRef ds:uri="bf44742c-fc46-4616-8725-dff710699ae5"/>
+    <ds:schemaRef ds:uri="http://purl.org/dc/terms/"/>
   </ds:schemaRefs>
 </ds:datastoreItem>
 </file>
@@ -8099,18 +8155,9 @@
 </file>
 
 <file path=customXml/itemProps3.xml><?xml version="1.0" encoding="utf-8"?>
-<ds:datastoreItem xmlns:ds="http://schemas.openxmlformats.org/officeDocument/2006/customXml" ds:itemID="{9B780DE2-F02B-441B-A6E9-690F74AB081C}">
+<ds:datastoreItem xmlns:ds="http://schemas.openxmlformats.org/officeDocument/2006/customXml" ds:itemID="{30F2025D-B737-41D8-9334-EE8F2C238280}">
   <ds:schemaRefs>
-    <ds:schemaRef ds:uri="http://schemas.microsoft.com/office/2006/documentManagement/types"/>
-    <ds:schemaRef ds:uri="634a623b-b5c2-41f0-818c-5d787e90d776"/>
-    <ds:schemaRef ds:uri="http://www.w3.org/XML/1998/namespace"/>
-    <ds:schemaRef ds:uri="http://schemas.openxmlformats.org/package/2006/metadata/core-properties"/>
-    <ds:schemaRef ds:uri="http://schemas.microsoft.com/office/2006/metadata/properties"/>
-    <ds:schemaRef ds:uri="http://purl.org/dc/elements/1.1/"/>
-    <ds:schemaRef ds:uri="http://purl.org/dc/dcmitype/"/>
-    <ds:schemaRef ds:uri="http://schemas.microsoft.com/office/infopath/2007/PartnerControls"/>
-    <ds:schemaRef ds:uri="bf44742c-fc46-4616-8725-dff710699ae5"/>
-    <ds:schemaRef ds:uri="http://purl.org/dc/terms/"/>
+    <ds:schemaRef ds:uri="http://schemas.microsoft.com/sharepoint/v3/contenttype/forms"/>
   </ds:schemaRefs>
 </ds:datastoreItem>
 </file>
</xml_diff>